<commit_message>
Added Content to DOC and PP
(backup porpose)
</commit_message>
<xml_diff>
--- a/doc/Präsentation/MEAN-PowerPoint.pptx
+++ b/doc/Präsentation/MEAN-PowerPoint.pptx
@@ -400,9 +400,7 @@
               <a:buNone/>
               <a:defRPr sz="2000">
                 <a:solidFill>
-                  <a:schemeClr val="bg2">
-                    <a:lumMod val="75000"/>
-                  </a:schemeClr>
+                  <a:schemeClr val="tx1"/>
                 </a:solidFill>
               </a:defRPr>
             </a:lvl1pPr>
@@ -489,7 +487,7 @@
           </a:lstStyle>
           <a:p>
             <a:r>
-              <a:rPr lang="de-DE" smtClean="0"/>
+              <a:rPr lang="de-DE" dirty="0" smtClean="0"/>
               <a:t>Formatvorlage des Untertitelmasters durch Klicken bearbeiten</a:t>
             </a:r>
             <a:endParaRPr lang="en-US" dirty="0"/>
@@ -509,13 +507,22 @@
         <p:spPr/>
         <p:txBody>
           <a:bodyPr/>
-          <a:lstStyle/>
+          <a:lstStyle>
+            <a:lvl1pPr>
+              <a:defRPr>
+                <a:solidFill>
+                  <a:schemeClr val="tx1"/>
+                </a:solidFill>
+              </a:defRPr>
+            </a:lvl1pPr>
+          </a:lstStyle>
           <a:p>
             <a:fld id="{1BA50D42-C9CD-4801-B293-61D1F53EC57E}" type="datetimeFigureOut">
               <a:rPr lang="de-DE" smtClean="0"/>
-              <a:t>08.02.2016</a:t>
+              <a:pPr/>
+              <a:t>09.02.2016</a:t>
             </a:fld>
-            <a:endParaRPr lang="de-DE"/>
+            <a:endParaRPr lang="de-DE" dirty="0"/>
           </a:p>
         </p:txBody>
       </p:sp>
@@ -532,9 +539,17 @@
         <p:spPr/>
         <p:txBody>
           <a:bodyPr/>
-          <a:lstStyle/>
-          <a:p>
-            <a:endParaRPr lang="de-DE"/>
+          <a:lstStyle>
+            <a:lvl1pPr>
+              <a:defRPr>
+                <a:solidFill>
+                  <a:schemeClr val="tx1"/>
+                </a:solidFill>
+              </a:defRPr>
+            </a:lvl1pPr>
+          </a:lstStyle>
+          <a:p>
+            <a:endParaRPr lang="de-DE" dirty="0"/>
           </a:p>
         </p:txBody>
       </p:sp>
@@ -551,13 +566,22 @@
         <p:spPr/>
         <p:txBody>
           <a:bodyPr/>
-          <a:lstStyle/>
+          <a:lstStyle>
+            <a:lvl1pPr>
+              <a:defRPr>
+                <a:solidFill>
+                  <a:schemeClr val="tx1"/>
+                </a:solidFill>
+              </a:defRPr>
+            </a:lvl1pPr>
+          </a:lstStyle>
           <a:p>
             <a:fld id="{6C6AE60A-B69C-4790-82F7-3882EDF23186}" type="slidenum">
               <a:rPr lang="de-DE" smtClean="0"/>
+              <a:pPr/>
               <a:t>‹Nr.›</a:t>
             </a:fld>
-            <a:endParaRPr lang="de-DE"/>
+            <a:endParaRPr lang="de-DE" dirty="0"/>
           </a:p>
         </p:txBody>
       </p:sp>
@@ -779,7 +803,7 @@
           <a:p>
             <a:fld id="{1BA50D42-C9CD-4801-B293-61D1F53EC57E}" type="datetimeFigureOut">
               <a:rPr lang="de-DE" smtClean="0"/>
-              <a:t>08.02.2016</a:t>
+              <a:t>09.02.2016</a:t>
             </a:fld>
             <a:endParaRPr lang="de-DE"/>
           </a:p>
@@ -1029,7 +1053,7 @@
           <a:p>
             <a:fld id="{1BA50D42-C9CD-4801-B293-61D1F53EC57E}" type="datetimeFigureOut">
               <a:rPr lang="de-DE" smtClean="0"/>
-              <a:t>08.02.2016</a:t>
+              <a:t>09.02.2016</a:t>
             </a:fld>
             <a:endParaRPr lang="de-DE"/>
           </a:p>
@@ -1337,7 +1361,7 @@
           <a:p>
             <a:fld id="{1BA50D42-C9CD-4801-B293-61D1F53EC57E}" type="datetimeFigureOut">
               <a:rPr lang="de-DE" smtClean="0"/>
-              <a:t>08.02.2016</a:t>
+              <a:t>09.02.2016</a:t>
             </a:fld>
             <a:endParaRPr lang="de-DE"/>
           </a:p>
@@ -1655,7 +1679,7 @@
           <a:p>
             <a:fld id="{1BA50D42-C9CD-4801-B293-61D1F53EC57E}" type="datetimeFigureOut">
               <a:rPr lang="de-DE" smtClean="0"/>
-              <a:t>08.02.2016</a:t>
+              <a:t>09.02.2016</a:t>
             </a:fld>
             <a:endParaRPr lang="de-DE"/>
           </a:p>
@@ -1957,7 +1981,7 @@
           <a:p>
             <a:fld id="{1BA50D42-C9CD-4801-B293-61D1F53EC57E}" type="datetimeFigureOut">
               <a:rPr lang="de-DE" smtClean="0"/>
-              <a:t>08.02.2016</a:t>
+              <a:t>09.02.2016</a:t>
             </a:fld>
             <a:endParaRPr lang="de-DE"/>
           </a:p>
@@ -2324,7 +2348,7 @@
           <a:p>
             <a:fld id="{1BA50D42-C9CD-4801-B293-61D1F53EC57E}" type="datetimeFigureOut">
               <a:rPr lang="de-DE" smtClean="0"/>
-              <a:t>08.02.2016</a:t>
+              <a:t>09.02.2016</a:t>
             </a:fld>
             <a:endParaRPr lang="de-DE"/>
           </a:p>
@@ -2510,7 +2534,7 @@
           <a:p>
             <a:fld id="{1BA50D42-C9CD-4801-B293-61D1F53EC57E}" type="datetimeFigureOut">
               <a:rPr lang="de-DE" smtClean="0"/>
-              <a:t>08.02.2016</a:t>
+              <a:t>09.02.2016</a:t>
             </a:fld>
             <a:endParaRPr lang="de-DE"/>
           </a:p>
@@ -2696,7 +2720,7 @@
           <a:p>
             <a:fld id="{1BA50D42-C9CD-4801-B293-61D1F53EC57E}" type="datetimeFigureOut">
               <a:rPr lang="de-DE" smtClean="0"/>
-              <a:t>08.02.2016</a:t>
+              <a:t>09.02.2016</a:t>
             </a:fld>
             <a:endParaRPr lang="de-DE"/>
           </a:p>
@@ -2792,10 +2816,18 @@
         </p:spPr>
         <p:txBody>
           <a:bodyPr/>
-          <a:lstStyle/>
-          <a:p>
-            <a:r>
-              <a:rPr lang="de-DE" smtClean="0"/>
+          <a:lstStyle>
+            <a:lvl1pPr>
+              <a:defRPr>
+                <a:solidFill>
+                  <a:schemeClr val="tx1"/>
+                </a:solidFill>
+              </a:defRPr>
+            </a:lvl1pPr>
+          </a:lstStyle>
+          <a:p>
+            <a:r>
+              <a:rPr lang="de-DE" dirty="0" smtClean="0"/>
               <a:t>Titelmasterformat durch Klicken bearbeiten</a:t>
             </a:r>
             <a:endParaRPr lang="en-US" dirty="0"/>
@@ -2820,39 +2852,75 @@
         </p:spPr>
         <p:txBody>
           <a:bodyPr anchor="ctr"/>
-          <a:lstStyle/>
+          <a:lstStyle>
+            <a:lvl1pPr>
+              <a:defRPr>
+                <a:solidFill>
+                  <a:schemeClr val="tx1"/>
+                </a:solidFill>
+              </a:defRPr>
+            </a:lvl1pPr>
+            <a:lvl2pPr>
+              <a:defRPr>
+                <a:solidFill>
+                  <a:schemeClr val="tx1"/>
+                </a:solidFill>
+              </a:defRPr>
+            </a:lvl2pPr>
+            <a:lvl3pPr>
+              <a:defRPr>
+                <a:solidFill>
+                  <a:schemeClr val="tx1"/>
+                </a:solidFill>
+              </a:defRPr>
+            </a:lvl3pPr>
+            <a:lvl4pPr>
+              <a:defRPr>
+                <a:solidFill>
+                  <a:schemeClr val="tx1"/>
+                </a:solidFill>
+              </a:defRPr>
+            </a:lvl4pPr>
+            <a:lvl5pPr>
+              <a:defRPr>
+                <a:solidFill>
+                  <a:schemeClr val="tx1"/>
+                </a:solidFill>
+              </a:defRPr>
+            </a:lvl5pPr>
+          </a:lstStyle>
           <a:p>
             <a:pPr lvl="0"/>
             <a:r>
-              <a:rPr lang="de-DE" smtClean="0"/>
+              <a:rPr lang="de-DE" dirty="0" smtClean="0"/>
               <a:t>Textmasterformat bearbeiten</a:t>
             </a:r>
           </a:p>
           <a:p>
             <a:pPr lvl="1"/>
             <a:r>
-              <a:rPr lang="de-DE" smtClean="0"/>
+              <a:rPr lang="de-DE" dirty="0" smtClean="0"/>
               <a:t>Zweite Ebene</a:t>
             </a:r>
           </a:p>
           <a:p>
             <a:pPr lvl="2"/>
             <a:r>
-              <a:rPr lang="de-DE" smtClean="0"/>
+              <a:rPr lang="de-DE" dirty="0" smtClean="0"/>
               <a:t>Dritte Ebene</a:t>
             </a:r>
           </a:p>
           <a:p>
             <a:pPr lvl="3"/>
             <a:r>
-              <a:rPr lang="de-DE" smtClean="0"/>
+              <a:rPr lang="de-DE" dirty="0" smtClean="0"/>
               <a:t>Vierte Ebene</a:t>
             </a:r>
           </a:p>
           <a:p>
             <a:pPr lvl="4"/>
             <a:r>
-              <a:rPr lang="de-DE" smtClean="0"/>
+              <a:rPr lang="de-DE" dirty="0" smtClean="0"/>
               <a:t>Fünfte Ebene</a:t>
             </a:r>
             <a:endParaRPr lang="en-US" dirty="0"/>
@@ -2876,7 +2944,7 @@
           <a:p>
             <a:fld id="{1BA50D42-C9CD-4801-B293-61D1F53EC57E}" type="datetimeFigureOut">
               <a:rPr lang="de-DE" smtClean="0"/>
-              <a:t>08.02.2016</a:t>
+              <a:t>09.02.2016</a:t>
             </a:fld>
             <a:endParaRPr lang="de-DE"/>
           </a:p>
@@ -3126,7 +3194,7 @@
           <a:p>
             <a:fld id="{1BA50D42-C9CD-4801-B293-61D1F53EC57E}" type="datetimeFigureOut">
               <a:rPr lang="de-DE" smtClean="0"/>
-              <a:t>08.02.2016</a:t>
+              <a:t>09.02.2016</a:t>
             </a:fld>
             <a:endParaRPr lang="de-DE"/>
           </a:p>
@@ -3373,7 +3441,7 @@
           <a:p>
             <a:fld id="{1BA50D42-C9CD-4801-B293-61D1F53EC57E}" type="datetimeFigureOut">
               <a:rPr lang="de-DE" smtClean="0"/>
-              <a:t>08.02.2016</a:t>
+              <a:t>09.02.2016</a:t>
             </a:fld>
             <a:endParaRPr lang="de-DE"/>
           </a:p>
@@ -3762,7 +3830,7 @@
           <a:p>
             <a:fld id="{1BA50D42-C9CD-4801-B293-61D1F53EC57E}" type="datetimeFigureOut">
               <a:rPr lang="de-DE" smtClean="0"/>
-              <a:t>08.02.2016</a:t>
+              <a:t>09.02.2016</a:t>
             </a:fld>
             <a:endParaRPr lang="de-DE"/>
           </a:p>
@@ -3891,7 +3959,7 @@
           <a:p>
             <a:fld id="{1BA50D42-C9CD-4801-B293-61D1F53EC57E}" type="datetimeFigureOut">
               <a:rPr lang="de-DE" smtClean="0"/>
-              <a:t>08.02.2016</a:t>
+              <a:t>09.02.2016</a:t>
             </a:fld>
             <a:endParaRPr lang="de-DE"/>
           </a:p>
@@ -3986,7 +4054,7 @@
           <a:p>
             <a:fld id="{1BA50D42-C9CD-4801-B293-61D1F53EC57E}" type="datetimeFigureOut">
               <a:rPr lang="de-DE" smtClean="0"/>
-              <a:t>08.02.2016</a:t>
+              <a:t>09.02.2016</a:t>
             </a:fld>
             <a:endParaRPr lang="de-DE"/>
           </a:p>
@@ -4241,7 +4309,7 @@
           <a:p>
             <a:fld id="{1BA50D42-C9CD-4801-B293-61D1F53EC57E}" type="datetimeFigureOut">
               <a:rPr lang="de-DE" smtClean="0"/>
-              <a:t>08.02.2016</a:t>
+              <a:t>09.02.2016</a:t>
             </a:fld>
             <a:endParaRPr lang="de-DE"/>
           </a:p>
@@ -4524,7 +4592,7 @@
           <a:p>
             <a:fld id="{1BA50D42-C9CD-4801-B293-61D1F53EC57E}" type="datetimeFigureOut">
               <a:rPr lang="de-DE" smtClean="0"/>
-              <a:t>08.02.2016</a:t>
+              <a:t>09.02.2016</a:t>
             </a:fld>
             <a:endParaRPr lang="de-DE"/>
           </a:p>
@@ -4591,7 +4659,7 @@
 </file>
 
 <file path=ppt/slideMasters/slideMaster1.xml><?xml version="1.0" encoding="utf-8"?>
-<p:sldMaster xmlns:a="http://schemas.openxmlformats.org/drawingml/2006/main" xmlns:r="http://schemas.openxmlformats.org/officeDocument/2006/relationships" xmlns:p="http://schemas.openxmlformats.org/presentationml/2006/main">
+<p:sldMaster xmlns:a="http://schemas.openxmlformats.org/drawingml/2006/main" xmlns:r="http://schemas.openxmlformats.org/officeDocument/2006/relationships" xmlns:p="http://schemas.openxmlformats.org/presentationml/2006/main" preserve="1">
   <p:cSld>
     <p:bg>
       <p:bgRef idx="1002">
@@ -4935,7 +5003,7 @@
           <a:p>
             <a:fld id="{1BA50D42-C9CD-4801-B293-61D1F53EC57E}" type="datetimeFigureOut">
               <a:rPr lang="de-DE" smtClean="0"/>
-              <a:t>08.02.2016</a:t>
+              <a:t>09.02.2016</a:t>
             </a:fld>
             <a:endParaRPr lang="de-DE"/>
           </a:p>
@@ -5628,91 +5696,21 @@
         </p:spPr>
         <p:txBody>
           <a:bodyPr>
-            <a:normAutofit fontScale="77500" lnSpcReduction="20000"/>
+            <a:normAutofit/>
           </a:bodyPr>
           <a:lstStyle/>
           <a:p>
             <a:r>
               <a:rPr lang="de-DE" dirty="0" smtClean="0"/>
-              <a:t>Aufgabenstellung</a:t>
+              <a:t>Login -&gt; E-Mail überprüfen</a:t>
             </a:r>
           </a:p>
           <a:p>
             <a:r>
               <a:rPr lang="de-DE" dirty="0" smtClean="0"/>
-              <a:t>Projekt</a:t>
-            </a:r>
-          </a:p>
-          <a:p>
-            <a:pPr lvl="1"/>
-            <a:r>
-              <a:rPr lang="de-DE" dirty="0" smtClean="0"/>
-              <a:t>Strukturplan</a:t>
-            </a:r>
-          </a:p>
-          <a:p>
-            <a:pPr lvl="1"/>
-            <a:r>
-              <a:rPr lang="de-DE" dirty="0" smtClean="0"/>
-              <a:t>Zeitplanung</a:t>
-            </a:r>
-          </a:p>
-          <a:p>
-            <a:pPr lvl="1"/>
-            <a:r>
-              <a:rPr lang="de-DE" dirty="0" smtClean="0"/>
-              <a:t>Arbeitspakete</a:t>
-            </a:r>
-          </a:p>
-          <a:p>
-            <a:r>
-              <a:rPr lang="de-DE" dirty="0" smtClean="0"/>
-              <a:t>Konzept</a:t>
-            </a:r>
-          </a:p>
-          <a:p>
-            <a:pPr lvl="1"/>
-            <a:r>
-              <a:rPr lang="de-DE" dirty="0" smtClean="0"/>
-              <a:t>Skizzen und </a:t>
-            </a:r>
-            <a:r>
-              <a:rPr lang="de-DE" dirty="0" err="1" smtClean="0"/>
-              <a:t>Mockups</a:t>
+              <a:t>„Multiplayer“</a:t>
             </a:r>
             <a:endParaRPr lang="de-DE" dirty="0" smtClean="0"/>
-          </a:p>
-          <a:p>
-            <a:pPr lvl="1"/>
-            <a:r>
-              <a:rPr lang="de-DE" dirty="0" smtClean="0"/>
-              <a:t>Datenmodelle</a:t>
-            </a:r>
-          </a:p>
-          <a:p>
-            <a:pPr lvl="1"/>
-            <a:r>
-              <a:rPr lang="de-DE" dirty="0" smtClean="0"/>
-              <a:t>Technologien</a:t>
-            </a:r>
-          </a:p>
-          <a:p>
-            <a:r>
-              <a:rPr lang="de-DE" dirty="0" smtClean="0"/>
-              <a:t>Vorstellung</a:t>
-            </a:r>
-          </a:p>
-          <a:p>
-            <a:r>
-              <a:rPr lang="de-DE" dirty="0" smtClean="0"/>
-              <a:t>Zukünftige Features</a:t>
-            </a:r>
-          </a:p>
-          <a:p>
-            <a:r>
-              <a:rPr lang="de-DE" dirty="0" smtClean="0"/>
-              <a:t>(Quellen)</a:t>
-            </a:r>
           </a:p>
         </p:txBody>
       </p:sp>

</xml_diff>

<commit_message>
Created MEAN-Logo + Work in DOC
- Logo "FinalLogo.png"
- Work on DOc
- Work on PP
</commit_message>
<xml_diff>
--- a/doc/Präsentation/MEAN-PowerPoint.pptx
+++ b/doc/Präsentation/MEAN-PowerPoint.pptx
@@ -5616,6 +5616,49 @@
           </a:p>
         </p:txBody>
       </p:sp>
+      <p:pic>
+        <p:nvPicPr>
+          <p:cNvPr id="4" name="Grafik 3"/>
+          <p:cNvPicPr>
+            <a:picLocks noChangeAspect="1"/>
+          </p:cNvPicPr>
+          <p:nvPr/>
+        </p:nvPicPr>
+        <p:blipFill>
+          <a:blip r:embed="rId2" cstate="print">
+            <a:extLst>
+              <a:ext uri="{28A0092B-C50C-407E-A947-70E740481C1C}">
+                <a14:useLocalDpi xmlns:a14="http://schemas.microsoft.com/office/drawing/2010/main" val="0"/>
+              </a:ext>
+            </a:extLst>
+          </a:blip>
+          <a:stretch>
+            <a:fillRect/>
+          </a:stretch>
+        </p:blipFill>
+        <p:spPr>
+          <a:xfrm>
+            <a:off x="5868144" y="3068960"/>
+            <a:ext cx="2852936" cy="2852936"/>
+          </a:xfrm>
+          <a:prstGeom prst="roundRect">
+            <a:avLst>
+              <a:gd name="adj" fmla="val 8594"/>
+            </a:avLst>
+          </a:prstGeom>
+          <a:solidFill>
+            <a:srgbClr val="FFFFFF">
+              <a:shade val="85000"/>
+            </a:srgbClr>
+          </a:solidFill>
+          <a:ln>
+            <a:noFill/>
+          </a:ln>
+          <a:effectLst>
+            <a:reflection blurRad="12700" stA="38000" endPos="28000" dist="5000" dir="5400000" sy="-100000" algn="bl" rotWithShape="0"/>
+          </a:effectLst>
+        </p:spPr>
+      </p:pic>
     </p:spTree>
     <p:extLst>
       <p:ext uri="{BB962C8B-B14F-4D97-AF65-F5344CB8AC3E}">

</xml_diff>